<commit_message>
Update 0 and 1
</commit_message>
<xml_diff>
--- a/1st_review_slide/1_data_handling_201009.pptx
+++ b/1st_review_slide/1_data_handling_201009.pptx
@@ -158,21 +158,6 @@
 
 <file path=ppt/comments/comment1.xml><?xml version="1.0" encoding="utf-8"?>
 <p:cmLst xmlns:a="http://schemas.openxmlformats.org/drawingml/2006/main" xmlns:r="http://schemas.openxmlformats.org/officeDocument/2006/relationships" xmlns:p="http://schemas.openxmlformats.org/presentationml/2006/main">
-  <p:cm authorId="2" dt="2020-10-22T17:11:21.856" idx="2">
-    <p:pos x="2533" y="452"/>
-    <p:text>1枚パイプ（%&gt;%）についての説明など入れるのはいかがでしょう。
-ショートカットなども含めると後の演習にも役立つかと思います。</p:text>
-    <p:extLst>
-      <p:ext uri="{C676402C-5697-4E1C-873F-D02D1690AC5C}">
-        <p15:threadingInfo xmlns:p15="http://schemas.microsoft.com/office/powerpoint/2012/main" timeZoneBias="-540"/>
-      </p:ext>
-    </p:extLst>
-  </p:cm>
-</p:cmLst>
-</file>
-
-<file path=ppt/comments/comment2.xml><?xml version="1.0" encoding="utf-8"?>
-<p:cmLst xmlns:a="http://schemas.openxmlformats.org/drawingml/2006/main" xmlns:r="http://schemas.openxmlformats.org/officeDocument/2006/relationships" xmlns:p="http://schemas.openxmlformats.org/presentationml/2006/main">
   <p:cm authorId="2" dt="2020-10-22T17:11:45.445" idx="3">
     <p:pos x="2225" y="1630"/>
     <p:text>以上、でしょうか</p:text>
@@ -185,7 +170,7 @@
 </p:cmLst>
 </file>
 
-<file path=ppt/comments/comment3.xml><?xml version="1.0" encoding="utf-8"?>
+<file path=ppt/comments/comment2.xml><?xml version="1.0" encoding="utf-8"?>
 <p:cmLst xmlns:a="http://schemas.openxmlformats.org/drawingml/2006/main" xmlns:r="http://schemas.openxmlformats.org/officeDocument/2006/relationships" xmlns:p="http://schemas.openxmlformats.org/presentationml/2006/main">
   <p:cm authorId="1" dt="2020-10-22T16:36:00.770" idx="1">
     <p:pos x="4136" y="2226"/>
@@ -20658,12 +20643,12 @@
           <a:graphicData uri="http://schemas.openxmlformats.org/presentationml/2006/ole">
             <mc:AlternateContent xmlns:mc="http://schemas.openxmlformats.org/markup-compatibility/2006">
               <mc:Choice xmlns:v="urn:schemas-microsoft-com:vml" Requires="v">
-                <p:oleObj spid="_x0000_s1039" name="文書" showAsIcon="1" r:id="rId4" imgW="914400" imgH="771480" progId="Word.Document.12">
+                <p:oleObj spid="_x0000_s1041" name="文書" showAsIcon="1" r:id="rId3" imgW="914400" imgH="771480" progId="Word.Document.12">
                   <p:embed/>
                 </p:oleObj>
               </mc:Choice>
               <mc:Fallback>
-                <p:oleObj name="文書" showAsIcon="1" r:id="rId4" imgW="914400" imgH="771480" progId="Word.Document.12">
+                <p:oleObj name="文書" showAsIcon="1" r:id="rId3" imgW="914400" imgH="771480" progId="Word.Document.12">
                   <p:embed/>
                   <p:pic>
                     <p:nvPicPr>
@@ -20672,7 +20657,7 @@
                       <p:nvPr/>
                     </p:nvPicPr>
                     <p:blipFill>
-                      <a:blip r:embed="rId5"/>
+                      <a:blip r:embed="rId4"/>
                       <a:stretch>
                         <a:fillRect/>
                       </a:stretch>
@@ -20715,12 +20700,12 @@
           <a:graphicData uri="http://schemas.openxmlformats.org/presentationml/2006/ole">
             <mc:AlternateContent xmlns:mc="http://schemas.openxmlformats.org/markup-compatibility/2006">
               <mc:Choice xmlns:v="urn:schemas-microsoft-com:vml" Requires="v">
-                <p:oleObj spid="_x0000_s1040" name="プレゼンテーション" showAsIcon="1" r:id="rId7" imgW="914400" imgH="771480" progId="PowerPoint.Show.12">
+                <p:oleObj spid="_x0000_s1042" name="プレゼンテーション" showAsIcon="1" r:id="rId5" imgW="914400" imgH="771480" progId="PowerPoint.Show.12">
                   <p:embed/>
                 </p:oleObj>
               </mc:Choice>
               <mc:Fallback>
-                <p:oleObj name="プレゼンテーション" showAsIcon="1" r:id="rId7" imgW="914400" imgH="771480" progId="PowerPoint.Show.12">
+                <p:oleObj name="プレゼンテーション" showAsIcon="1" r:id="rId5" imgW="914400" imgH="771480" progId="PowerPoint.Show.12">
                   <p:embed/>
                   <p:pic>
                     <p:nvPicPr>
@@ -20729,7 +20714,7 @@
                       <p:nvPr/>
                     </p:nvPicPr>
                     <p:blipFill>
-                      <a:blip r:embed="rId8"/>
+                      <a:blip r:embed="rId6"/>
                       <a:stretch>
                         <a:fillRect/>
                       </a:stretch>

</xml_diff>